<commit_message>
startup lvl 1 comic
</commit_message>
<xml_diff>
--- a/Kusomari presentatie.pptx
+++ b/Kusomari presentatie.pptx
@@ -7,10 +7,11 @@
   <p:sldIdLst>
     <p:sldId id="256" r:id="rId2"/>
     <p:sldId id="257" r:id="rId3"/>
-    <p:sldId id="258" r:id="rId4"/>
-    <p:sldId id="259" r:id="rId5"/>
-    <p:sldId id="260" r:id="rId6"/>
-    <p:sldId id="261" r:id="rId7"/>
+    <p:sldId id="262" r:id="rId4"/>
+    <p:sldId id="258" r:id="rId5"/>
+    <p:sldId id="259" r:id="rId6"/>
+    <p:sldId id="260" r:id="rId7"/>
+    <p:sldId id="261" r:id="rId8"/>
   </p:sldIdLst>
   <p:sldSz cx="12192000" cy="6858000"/>
   <p:notesSz cx="6858000" cy="9144000"/>
@@ -109,6 +110,11 @@
       </a:defRPr>
     </a:lvl9pPr>
   </p:defaultTextStyle>
+  <p:extLst>
+    <p:ext uri="{EFAFB233-063F-42B5-8137-9DF3F51BA10A}">
+      <p15:sldGuideLst xmlns:p15="http://schemas.microsoft.com/office/powerpoint/2012/main"/>
+    </p:ext>
+  </p:extLst>
 </p:presentation>
 </file>
 
@@ -244,7 +250,7 @@
             <a:fld id="{B61BEF0D-F0BB-DE4B-95CE-6DB70DBA9567}" type="datetimeFigureOut">
               <a:rPr lang="en-US" smtClean="0"/>
               <a:pPr/>
-              <a:t>7/13/2017</a:t>
+              <a:t>7/17/2017</a:t>
             </a:fld>
             <a:endParaRPr lang="en-US" dirty="0"/>
           </a:p>
@@ -415,7 +421,7 @@
           <a:p>
             <a:fld id="{55C6B4A9-1611-4792-9094-5F34BCA07E0B}" type="datetimeFigureOut">
               <a:rPr lang="en-US" smtClean="0"/>
-              <a:t>7/13/2017</a:t>
+              <a:t>7/17/2017</a:t>
             </a:fld>
             <a:endParaRPr lang="en-US" dirty="0"/>
           </a:p>
@@ -596,7 +602,7 @@
             <a:fld id="{B61BEF0D-F0BB-DE4B-95CE-6DB70DBA9567}" type="datetimeFigureOut">
               <a:rPr lang="en-US" smtClean="0"/>
               <a:pPr/>
-              <a:t>7/13/2017</a:t>
+              <a:t>7/17/2017</a:t>
             </a:fld>
             <a:endParaRPr lang="en-US" dirty="0"/>
           </a:p>
@@ -768,7 +774,7 @@
             <a:fld id="{B61BEF0D-F0BB-DE4B-95CE-6DB70DBA9567}" type="datetimeFigureOut">
               <a:rPr lang="en-US" smtClean="0"/>
               <a:pPr/>
-              <a:t>7/13/2017</a:t>
+              <a:t>7/17/2017</a:t>
             </a:fld>
             <a:endParaRPr lang="en-US" dirty="0"/>
           </a:p>
@@ -1016,7 +1022,7 @@
             <a:fld id="{B61BEF0D-F0BB-DE4B-95CE-6DB70DBA9567}" type="datetimeFigureOut">
               <a:rPr lang="en-US" smtClean="0"/>
               <a:pPr/>
-              <a:t>7/13/2017</a:t>
+              <a:t>7/17/2017</a:t>
             </a:fld>
             <a:endParaRPr lang="en-US" dirty="0"/>
           </a:p>
@@ -1249,7 +1255,7 @@
           <a:p>
             <a:fld id="{EB712588-04B1-427B-82EE-E8DB90309F08}" type="datetimeFigureOut">
               <a:rPr lang="en-US" smtClean="0"/>
-              <a:t>7/13/2017</a:t>
+              <a:t>7/17/2017</a:t>
             </a:fld>
             <a:endParaRPr lang="en-US" dirty="0"/>
           </a:p>
@@ -1617,7 +1623,7 @@
             <a:fld id="{B61BEF0D-F0BB-DE4B-95CE-6DB70DBA9567}" type="datetimeFigureOut">
               <a:rPr lang="en-US" smtClean="0"/>
               <a:pPr/>
-              <a:t>7/13/2017</a:t>
+              <a:t>7/17/2017</a:t>
             </a:fld>
             <a:endParaRPr lang="en-US" dirty="0"/>
           </a:p>
@@ -1737,7 +1743,7 @@
             <a:fld id="{B61BEF0D-F0BB-DE4B-95CE-6DB70DBA9567}" type="datetimeFigureOut">
               <a:rPr lang="en-US" smtClean="0"/>
               <a:pPr/>
-              <a:t>7/13/2017</a:t>
+              <a:t>7/17/2017</a:t>
             </a:fld>
             <a:endParaRPr lang="en-US" dirty="0"/>
           </a:p>
@@ -1834,7 +1840,7 @@
             <a:fld id="{B61BEF0D-F0BB-DE4B-95CE-6DB70DBA9567}" type="datetimeFigureOut">
               <a:rPr lang="en-US" smtClean="0"/>
               <a:pPr/>
-              <a:t>7/13/2017</a:t>
+              <a:t>7/17/2017</a:t>
             </a:fld>
             <a:endParaRPr lang="en-US" dirty="0"/>
           </a:p>
@@ -2112,7 +2118,7 @@
           <a:p>
             <a:fld id="{42A54C80-263E-416B-A8E0-580EDEADCBDC}" type="datetimeFigureOut">
               <a:rPr lang="en-US" smtClean="0"/>
-              <a:t>7/13/2017</a:t>
+              <a:t>7/17/2017</a:t>
             </a:fld>
             <a:endParaRPr lang="en-US" dirty="0"/>
           </a:p>
@@ -2370,7 +2376,7 @@
             <a:fld id="{B61BEF0D-F0BB-DE4B-95CE-6DB70DBA9567}" type="datetimeFigureOut">
               <a:rPr lang="en-US" smtClean="0"/>
               <a:pPr/>
-              <a:t>7/13/2017</a:t>
+              <a:t>7/17/2017</a:t>
             </a:fld>
             <a:endParaRPr lang="en-US" dirty="0"/>
           </a:p>
@@ -2594,7 +2600,7 @@
             <a:fld id="{B61BEF0D-F0BB-DE4B-95CE-6DB70DBA9567}" type="datetimeFigureOut">
               <a:rPr lang="en-US" smtClean="0"/>
               <a:pPr/>
-              <a:t>7/13/2017</a:t>
+              <a:t>7/17/2017</a:t>
             </a:fld>
             <a:endParaRPr lang="en-US" dirty="0"/>
           </a:p>
@@ -3120,7 +3126,30 @@
               <a:rPr lang="nl-BE" dirty="0">
                 <a:latin typeface="Endutt-With-Numbers-v2" pitchFamily="2" charset="0"/>
               </a:rPr>
-              <a:t>Wat heb je gemaakt eerder foto’s zetten!!!!</a:t>
+              <a:t>Wat heb je gemaakt </a:t>
+            </a:r>
+            <a:br>
+              <a:rPr lang="nl-BE" dirty="0">
+                <a:latin typeface="Endutt-With-Numbers-v2" pitchFamily="2" charset="0"/>
+              </a:rPr>
+            </a:br>
+            <a:r>
+              <a:rPr lang="nl-BE" dirty="0">
+                <a:latin typeface="Endutt-With-Numbers-v2" pitchFamily="2" charset="0"/>
+              </a:rPr>
+              <a:t>eerder foto’s zetten!!!! Alle </a:t>
+            </a:r>
+            <a:r>
+              <a:rPr lang="nl-BE" dirty="0" err="1">
+                <a:latin typeface="Endutt-With-Numbers-v2" pitchFamily="2" charset="0"/>
+              </a:rPr>
+              <a:t>dias</a:t>
+            </a:r>
+            <a:r>
+              <a:rPr lang="nl-BE" dirty="0">
+                <a:latin typeface="Endutt-With-Numbers-v2" pitchFamily="2" charset="0"/>
+              </a:rPr>
+              <a:t>!</a:t>
             </a:r>
           </a:p>
         </p:txBody>
@@ -3204,8 +3233,11 @@
               <a:rPr lang="nl-BE" dirty="0">
                 <a:latin typeface="Endutt-With-Numbers-v2" pitchFamily="2" charset="0"/>
               </a:rPr>
-              <a:t>software hardware wat zelf wat niet</a:t>
-            </a:r>
+              <a:t>software hardware</a:t>
+            </a:r>
+            <a:endParaRPr lang="nl-BE" dirty="0">
+              <a:latin typeface="Endutt-With-Numbers-v2" pitchFamily="2" charset="0"/>
+            </a:endParaRPr>
           </a:p>
         </p:txBody>
       </p:sp>
@@ -3227,8 +3259,8 @@
         </p:blipFill>
         <p:spPr>
           <a:xfrm rot="20714239">
-            <a:off x="641253" y="2431659"/>
-            <a:ext cx="3382108" cy="1902436"/>
+            <a:off x="458819" y="1930352"/>
+            <a:ext cx="3989121" cy="2243881"/>
           </a:xfrm>
         </p:spPr>
       </p:pic>
@@ -3248,8 +3280,8 @@
         </p:blipFill>
         <p:spPr>
           <a:xfrm rot="641128">
-            <a:off x="7423383" y="2068164"/>
-            <a:ext cx="4248444" cy="1890557"/>
+            <a:off x="6849753" y="1613423"/>
+            <a:ext cx="4986729" cy="2219094"/>
           </a:xfrm>
           <a:prstGeom prst="rect">
             <a:avLst/>
@@ -3279,54 +3311,6 @@
           </a:prstGeom>
         </p:spPr>
       </p:pic>
-      <p:sp>
-        <p:nvSpPr>
-          <p:cNvPr id="17" name="Tekstvak 16"/>
-          <p:cNvSpPr txBox="1"/>
-          <p:nvPr/>
-        </p:nvSpPr>
-        <p:spPr>
-          <a:xfrm>
-            <a:off x="4726546" y="2537138"/>
-            <a:ext cx="2210862" cy="646331"/>
-          </a:xfrm>
-          <a:prstGeom prst="rect">
-            <a:avLst/>
-          </a:prstGeom>
-          <a:noFill/>
-        </p:spPr>
-        <p:txBody>
-          <a:bodyPr wrap="none" rtlCol="0">
-            <a:spAutoFit/>
-          </a:bodyPr>
-          <a:lstStyle/>
-          <a:p>
-            <a:r>
-              <a:rPr lang="nl-BE" dirty="0"/>
-              <a:t>Foto </a:t>
-            </a:r>
-            <a:r>
-              <a:rPr lang="nl-BE" dirty="0" err="1"/>
-              <a:t>loading</a:t>
-            </a:r>
-            <a:r>
-              <a:rPr lang="nl-BE" dirty="0"/>
-              <a:t> screen</a:t>
-            </a:r>
-          </a:p>
-          <a:p>
-            <a:r>
-              <a:rPr lang="nl-BE" dirty="0"/>
-              <a:t>Foto </a:t>
-            </a:r>
-            <a:r>
-              <a:rPr lang="nl-BE" dirty="0" err="1"/>
-              <a:t>shadercode</a:t>
-            </a:r>
-            <a:endParaRPr lang="nl-BE" dirty="0"/>
-          </a:p>
-        </p:txBody>
-      </p:sp>
       <p:pic>
         <p:nvPicPr>
           <p:cNvPr id="19" name="Afbeelding 18"/>
@@ -3351,10 +3335,81 @@
           </a:prstGeom>
         </p:spPr>
       </p:pic>
+      <p:pic>
+        <p:nvPicPr>
+          <p:cNvPr id="5" name="Afbeelding 4"/>
+          <p:cNvPicPr>
+            <a:picLocks noChangeAspect="1"/>
+          </p:cNvPicPr>
+          <p:nvPr/>
+        </p:nvPicPr>
+        <p:blipFill>
+          <a:blip r:embed="rId6"/>
+          <a:stretch>
+            <a:fillRect/>
+          </a:stretch>
+        </p:blipFill>
+        <p:spPr>
+          <a:xfrm rot="1012801">
+            <a:off x="777416" y="5238084"/>
+            <a:ext cx="1193205" cy="1193205"/>
+          </a:xfrm>
+          <a:prstGeom prst="rect">
+            <a:avLst/>
+          </a:prstGeom>
+        </p:spPr>
+      </p:pic>
+      <p:pic>
+        <p:nvPicPr>
+          <p:cNvPr id="4" name="Afbeelding 3"/>
+          <p:cNvPicPr>
+            <a:picLocks noChangeAspect="1"/>
+          </p:cNvPicPr>
+          <p:nvPr/>
+        </p:nvPicPr>
+        <p:blipFill rotWithShape="1">
+          <a:blip r:embed="rId7"/>
+          <a:srcRect l="29654" t="14841" r="29611" b="16106"/>
+          <a:stretch/>
+        </p:blipFill>
+        <p:spPr>
+          <a:xfrm rot="21211371">
+            <a:off x="2955108" y="5415195"/>
+            <a:ext cx="1068438" cy="1020142"/>
+          </a:xfrm>
+          <a:prstGeom prst="rect">
+            <a:avLst/>
+          </a:prstGeom>
+        </p:spPr>
+      </p:pic>
+      <p:pic>
+        <p:nvPicPr>
+          <p:cNvPr id="7" name="Afbeelding 6"/>
+          <p:cNvPicPr>
+            <a:picLocks noChangeAspect="1"/>
+          </p:cNvPicPr>
+          <p:nvPr/>
+        </p:nvPicPr>
+        <p:blipFill>
+          <a:blip r:embed="rId8"/>
+          <a:stretch>
+            <a:fillRect/>
+          </a:stretch>
+        </p:blipFill>
+        <p:spPr>
+          <a:xfrm rot="537620">
+            <a:off x="3914608" y="4194619"/>
+            <a:ext cx="901650" cy="901650"/>
+          </a:xfrm>
+          <a:prstGeom prst="rect">
+            <a:avLst/>
+          </a:prstGeom>
+        </p:spPr>
+      </p:pic>
     </p:spTree>
     <p:extLst>
       <p:ext uri="{BB962C8B-B14F-4D97-AF65-F5344CB8AC3E}">
-        <p14:creationId xmlns:p14="http://schemas.microsoft.com/office/powerpoint/2010/main" val="562305762"/>
+        <p14:creationId xmlns:p14="http://schemas.microsoft.com/office/powerpoint/2010/main" val="1957170930"/>
       </p:ext>
     </p:extLst>
   </p:cSld>
@@ -3393,41 +3448,72 @@
         </p:nvSpPr>
         <p:spPr/>
         <p:txBody>
-          <a:bodyPr/>
+          <a:bodyPr>
+            <a:normAutofit/>
+          </a:bodyPr>
           <a:lstStyle/>
           <a:p>
             <a:r>
               <a:rPr lang="nl-BE" dirty="0">
                 <a:latin typeface="Endutt-With-Numbers-v2" pitchFamily="2" charset="0"/>
               </a:rPr>
-              <a:t>Problemen en moeilijkheden en oplossing</a:t>
-            </a:r>
-          </a:p>
-        </p:txBody>
-      </p:sp>
-      <p:sp>
-        <p:nvSpPr>
-          <p:cNvPr id="3" name="Tijdelijke aanduiding voor inhoud 2"/>
-          <p:cNvSpPr>
-            <a:spLocks noGrp="1"/>
-          </p:cNvSpPr>
-          <p:nvPr>
-            <p:ph idx="1"/>
-          </p:nvPr>
-        </p:nvSpPr>
-        <p:spPr/>
-        <p:txBody>
-          <a:bodyPr/>
-          <a:lstStyle/>
-          <a:p>
-            <a:endParaRPr lang="nl-BE"/>
+              <a:t>Wat zelf gemaakt wat niet</a:t>
+            </a:r>
+          </a:p>
+        </p:txBody>
+      </p:sp>
+      <p:sp>
+        <p:nvSpPr>
+          <p:cNvPr id="17" name="Tekstvak 16"/>
+          <p:cNvSpPr txBox="1"/>
+          <p:nvPr/>
+        </p:nvSpPr>
+        <p:spPr>
+          <a:xfrm>
+            <a:off x="4726546" y="2537138"/>
+            <a:ext cx="2210862" cy="646331"/>
+          </a:xfrm>
+          <a:prstGeom prst="rect">
+            <a:avLst/>
+          </a:prstGeom>
+          <a:noFill/>
+        </p:spPr>
+        <p:txBody>
+          <a:bodyPr wrap="none" rtlCol="0">
+            <a:spAutoFit/>
+          </a:bodyPr>
+          <a:lstStyle/>
+          <a:p>
+            <a:r>
+              <a:rPr lang="nl-BE" dirty="0"/>
+              <a:t>Foto </a:t>
+            </a:r>
+            <a:r>
+              <a:rPr lang="nl-BE" dirty="0" err="1"/>
+              <a:t>loading</a:t>
+            </a:r>
+            <a:r>
+              <a:rPr lang="nl-BE" dirty="0"/>
+              <a:t> screen</a:t>
+            </a:r>
+          </a:p>
+          <a:p>
+            <a:r>
+              <a:rPr lang="nl-BE" dirty="0"/>
+              <a:t>Foto </a:t>
+            </a:r>
+            <a:r>
+              <a:rPr lang="nl-BE" dirty="0" err="1"/>
+              <a:t>shadercode</a:t>
+            </a:r>
+            <a:endParaRPr lang="nl-BE" dirty="0"/>
           </a:p>
         </p:txBody>
       </p:sp>
     </p:spTree>
     <p:extLst>
       <p:ext uri="{BB962C8B-B14F-4D97-AF65-F5344CB8AC3E}">
-        <p14:creationId xmlns:p14="http://schemas.microsoft.com/office/powerpoint/2010/main" val="1464984112"/>
+        <p14:creationId xmlns:p14="http://schemas.microsoft.com/office/powerpoint/2010/main" val="562305762"/>
       </p:ext>
     </p:extLst>
   </p:cSld>
@@ -3473,7 +3559,7 @@
               <a:rPr lang="nl-BE" dirty="0">
                 <a:latin typeface="Endutt-With-Numbers-v2" pitchFamily="2" charset="0"/>
               </a:rPr>
-              <a:t>Resultaten, conclusies, mogelijke verbeteringen</a:t>
+              <a:t>Problemen en moeilijkheden en oplossing</a:t>
             </a:r>
           </a:p>
         </p:txBody>
@@ -3500,7 +3586,7 @@
     </p:spTree>
     <p:extLst>
       <p:ext uri="{BB962C8B-B14F-4D97-AF65-F5344CB8AC3E}">
-        <p14:creationId xmlns:p14="http://schemas.microsoft.com/office/powerpoint/2010/main" val="4216443327"/>
+        <p14:creationId xmlns:p14="http://schemas.microsoft.com/office/powerpoint/2010/main" val="1464984112"/>
       </p:ext>
     </p:extLst>
   </p:cSld>
@@ -3539,26 +3625,104 @@
         </p:nvSpPr>
         <p:spPr/>
         <p:txBody>
+          <a:bodyPr/>
+          <a:lstStyle/>
+          <a:p>
+            <a:r>
+              <a:rPr lang="nl-BE" dirty="0">
+                <a:latin typeface="Endutt-With-Numbers-v2" pitchFamily="2" charset="0"/>
+              </a:rPr>
+              <a:t>Resultaten, conclusies, mogelijke verbeteringen</a:t>
+            </a:r>
+          </a:p>
+        </p:txBody>
+      </p:sp>
+      <p:sp>
+        <p:nvSpPr>
+          <p:cNvPr id="3" name="Tijdelijke aanduiding voor inhoud 2"/>
+          <p:cNvSpPr>
+            <a:spLocks noGrp="1"/>
+          </p:cNvSpPr>
+          <p:nvPr>
+            <p:ph idx="1"/>
+          </p:nvPr>
+        </p:nvSpPr>
+        <p:spPr/>
+        <p:txBody>
+          <a:bodyPr/>
+          <a:lstStyle/>
+          <a:p>
+            <a:endParaRPr lang="nl-BE"/>
+          </a:p>
+        </p:txBody>
+      </p:sp>
+    </p:spTree>
+    <p:extLst>
+      <p:ext uri="{BB962C8B-B14F-4D97-AF65-F5344CB8AC3E}">
+        <p14:creationId xmlns:p14="http://schemas.microsoft.com/office/powerpoint/2010/main" val="4216443327"/>
+      </p:ext>
+    </p:extLst>
+  </p:cSld>
+  <p:clrMapOvr>
+    <a:masterClrMapping/>
+  </p:clrMapOvr>
+</p:sld>
+</file>
+
+<file path=ppt/slides/slide7.xml><?xml version="1.0" encoding="utf-8"?>
+<p:sld xmlns:a="http://schemas.openxmlformats.org/drawingml/2006/main" xmlns:r="http://schemas.openxmlformats.org/officeDocument/2006/relationships" xmlns:p="http://schemas.openxmlformats.org/presentationml/2006/main">
+  <p:cSld>
+    <p:spTree>
+      <p:nvGrpSpPr>
+        <p:cNvPr id="1" name=""/>
+        <p:cNvGrpSpPr/>
+        <p:nvPr/>
+      </p:nvGrpSpPr>
+      <p:grpSpPr>
+        <a:xfrm>
+          <a:off x="0" y="0"/>
+          <a:ext cx="0" cy="0"/>
+          <a:chOff x="0" y="0"/>
+          <a:chExt cx="0" cy="0"/>
+        </a:xfrm>
+      </p:grpSpPr>
+      <p:sp>
+        <p:nvSpPr>
+          <p:cNvPr id="2" name="Titel 1"/>
+          <p:cNvSpPr>
+            <a:spLocks noGrp="1"/>
+          </p:cNvSpPr>
+          <p:nvPr>
+            <p:ph type="title"/>
+          </p:nvPr>
+        </p:nvSpPr>
+        <p:spPr>
+          <a:xfrm>
+            <a:off x="0" y="1957589"/>
+            <a:ext cx="12191999" cy="2643725"/>
+          </a:xfrm>
+        </p:spPr>
+        <p:txBody>
           <a:bodyPr>
-            <a:normAutofit/>
+            <a:noAutofit/>
           </a:bodyPr>
           <a:lstStyle/>
           <a:p>
             <a:pPr algn="ctr"/>
             <a:r>
-              <a:rPr lang="nl-BE" sz="6600" dirty="0">
+              <a:rPr lang="nl-BE" sz="16600" dirty="0">
                 <a:latin typeface="Endutt-With-Numbers-v2" pitchFamily="2" charset="0"/>
               </a:rPr>
               <a:t>It’s </a:t>
             </a:r>
             <a:r>
-              <a:rPr lang="nl-BE" sz="6600" dirty="0" err="1">
+              <a:rPr lang="nl-BE" sz="16600" dirty="0" err="1">
                 <a:latin typeface="Endutt-With-Numbers-v2" pitchFamily="2" charset="0"/>
               </a:rPr>
               <a:t>showtime</a:t>
             </a:r>
             <a:r>
-              <a:rPr lang="nl-BE" sz="6600" dirty="0">
+              <a:rPr lang="nl-BE" sz="16600" dirty="0">
                 <a:latin typeface="Endutt-With-Numbers-v2" pitchFamily="2" charset="0"/>
               </a:rPr>
               <a:t>!</a:t>

</xml_diff>